<commit_message>
added some new info
</commit_message>
<xml_diff>
--- a/Poster/GRC2019_poster.pptx
+++ b/Poster/GRC2019_poster.pptx
@@ -208,7 +208,7 @@
           <a:p>
             <a:fld id="{FF16F1CD-CCDF-784F-BD1A-E45321D675CB}" type="datetimeFigureOut">
               <a:rPr lang="en-US" smtClean="0"/>
-              <a:t>5/23/19</a:t>
+              <a:t>5/24/19</a:t>
             </a:fld>
             <a:endParaRPr lang="en-US"/>
           </a:p>
@@ -690,7 +690,7 @@
           <a:p>
             <a:fld id="{7FF9FAE2-0C5C-4E49-9521-393C8F8F647B}" type="datetimeFigureOut">
               <a:rPr lang="en-US" smtClean="0"/>
-              <a:t>5/23/19</a:t>
+              <a:t>5/24/19</a:t>
             </a:fld>
             <a:endParaRPr lang="en-US"/>
           </a:p>
@@ -860,7 +860,7 @@
           <a:p>
             <a:fld id="{7FF9FAE2-0C5C-4E49-9521-393C8F8F647B}" type="datetimeFigureOut">
               <a:rPr lang="en-US" smtClean="0"/>
-              <a:t>5/23/19</a:t>
+              <a:t>5/24/19</a:t>
             </a:fld>
             <a:endParaRPr lang="en-US"/>
           </a:p>
@@ -1040,7 +1040,7 @@
           <a:p>
             <a:fld id="{7FF9FAE2-0C5C-4E49-9521-393C8F8F647B}" type="datetimeFigureOut">
               <a:rPr lang="en-US" smtClean="0"/>
-              <a:t>5/23/19</a:t>
+              <a:t>5/24/19</a:t>
             </a:fld>
             <a:endParaRPr lang="en-US"/>
           </a:p>
@@ -1210,7 +1210,7 @@
           <a:p>
             <a:fld id="{7FF9FAE2-0C5C-4E49-9521-393C8F8F647B}" type="datetimeFigureOut">
               <a:rPr lang="en-US" smtClean="0"/>
-              <a:t>5/23/19</a:t>
+              <a:t>5/24/19</a:t>
             </a:fld>
             <a:endParaRPr lang="en-US"/>
           </a:p>
@@ -1454,7 +1454,7 @@
           <a:p>
             <a:fld id="{7FF9FAE2-0C5C-4E49-9521-393C8F8F647B}" type="datetimeFigureOut">
               <a:rPr lang="en-US" smtClean="0"/>
-              <a:t>5/23/19</a:t>
+              <a:t>5/24/19</a:t>
             </a:fld>
             <a:endParaRPr lang="en-US"/>
           </a:p>
@@ -1686,7 +1686,7 @@
           <a:p>
             <a:fld id="{7FF9FAE2-0C5C-4E49-9521-393C8F8F647B}" type="datetimeFigureOut">
               <a:rPr lang="en-US" smtClean="0"/>
-              <a:t>5/23/19</a:t>
+              <a:t>5/24/19</a:t>
             </a:fld>
             <a:endParaRPr lang="en-US"/>
           </a:p>
@@ -2053,7 +2053,7 @@
           <a:p>
             <a:fld id="{7FF9FAE2-0C5C-4E49-9521-393C8F8F647B}" type="datetimeFigureOut">
               <a:rPr lang="en-US" smtClean="0"/>
-              <a:t>5/23/19</a:t>
+              <a:t>5/24/19</a:t>
             </a:fld>
             <a:endParaRPr lang="en-US"/>
           </a:p>
@@ -2171,7 +2171,7 @@
           <a:p>
             <a:fld id="{7FF9FAE2-0C5C-4E49-9521-393C8F8F647B}" type="datetimeFigureOut">
               <a:rPr lang="en-US" smtClean="0"/>
-              <a:t>5/23/19</a:t>
+              <a:t>5/24/19</a:t>
             </a:fld>
             <a:endParaRPr lang="en-US"/>
           </a:p>
@@ -2266,7 +2266,7 @@
           <a:p>
             <a:fld id="{7FF9FAE2-0C5C-4E49-9521-393C8F8F647B}" type="datetimeFigureOut">
               <a:rPr lang="en-US" smtClean="0"/>
-              <a:t>5/23/19</a:t>
+              <a:t>5/24/19</a:t>
             </a:fld>
             <a:endParaRPr lang="en-US"/>
           </a:p>
@@ -2543,7 +2543,7 @@
           <a:p>
             <a:fld id="{7FF9FAE2-0C5C-4E49-9521-393C8F8F647B}" type="datetimeFigureOut">
               <a:rPr lang="en-US" smtClean="0"/>
-              <a:t>5/23/19</a:t>
+              <a:t>5/24/19</a:t>
             </a:fld>
             <a:endParaRPr lang="en-US"/>
           </a:p>
@@ -2800,7 +2800,7 @@
           <a:p>
             <a:fld id="{7FF9FAE2-0C5C-4E49-9521-393C8F8F647B}" type="datetimeFigureOut">
               <a:rPr lang="en-US" smtClean="0"/>
-              <a:t>5/23/19</a:t>
+              <a:t>5/24/19</a:t>
             </a:fld>
             <a:endParaRPr lang="en-US"/>
           </a:p>
@@ -3013,7 +3013,7 @@
           <a:p>
             <a:fld id="{7FF9FAE2-0C5C-4E49-9521-393C8F8F647B}" type="datetimeFigureOut">
               <a:rPr lang="en-US" smtClean="0"/>
-              <a:t>5/23/19</a:t>
+              <a:t>5/24/19</a:t>
             </a:fld>
             <a:endParaRPr lang="en-US"/>
           </a:p>
@@ -3854,7 +3854,7 @@
         <p:spPr>
           <a:xfrm>
             <a:off x="1163780" y="36976437"/>
-            <a:ext cx="19784291" cy="1015663"/>
+            <a:ext cx="19784291" cy="2862322"/>
           </a:xfrm>
           <a:prstGeom prst="rect">
             <a:avLst/>
@@ -3874,23 +3874,26 @@
                 </a:solidFill>
                 <a:latin typeface="Corbel" panose="020B0503020204020204" pitchFamily="34" charset="0"/>
               </a:rPr>
-              <a:t>Answer:</a:t>
-            </a:r>
-            <a:r>
-              <a:rPr lang="en-US" sz="6000" dirty="0">
+              <a:t>Answer: With optimal acclimation, C4 plants have the strongest advantage over</a:t>
+            </a:r>
+            <a:r>
+              <a:rPr lang="en-US" sz="6000" b="1" baseline="-25000" dirty="0">
                 <a:solidFill>
                   <a:srgbClr val="009193"/>
                 </a:solidFill>
                 <a:latin typeface="Corbel" panose="020B0503020204020204" pitchFamily="34" charset="0"/>
               </a:rPr>
-              <a:t> …</a:t>
-            </a:r>
-            <a:endParaRPr lang="en-US" sz="6000" b="1" dirty="0">
-              <a:solidFill>
-                <a:srgbClr val="009193"/>
-              </a:solidFill>
-              <a:latin typeface="Corbel" panose="020B0503020204020204" pitchFamily="34" charset="0"/>
-            </a:endParaRPr>
+              <a:t> </a:t>
+            </a:r>
+            <a:r>
+              <a:rPr lang="en-US" sz="6000" b="1" dirty="0">
+                <a:solidFill>
+                  <a:srgbClr val="009193"/>
+                </a:solidFill>
+                <a:latin typeface="Corbel" panose="020B0503020204020204" pitchFamily="34" charset="0"/>
+              </a:rPr>
+              <a:t>C3 plants in warm, dry, high light, and low CO2 environments</a:t>
+            </a:r>
           </a:p>
         </p:txBody>
       </p:sp>
@@ -4374,6 +4377,111 @@
           </a:p>
         </p:txBody>
       </p:sp>
+      <p:sp>
+        <p:nvSpPr>
+          <p:cNvPr id="18" name="TextBox 17">
+            <a:extLst>
+              <a:ext uri="{FF2B5EF4-FFF2-40B4-BE49-F238E27FC236}">
+                <a16:creationId xmlns:a16="http://schemas.microsoft.com/office/drawing/2014/main" id="{BF280D5F-C739-6C4B-A5A1-4364A829AF6B}"/>
+              </a:ext>
+            </a:extLst>
+          </p:cNvPr>
+          <p:cNvSpPr txBox="1"/>
+          <p:nvPr/>
+        </p:nvSpPr>
+        <p:spPr>
+          <a:xfrm>
+            <a:off x="18768817" y="32070796"/>
+            <a:ext cx="3244799" cy="2123658"/>
+          </a:xfrm>
+          <a:prstGeom prst="rect">
+            <a:avLst/>
+          </a:prstGeom>
+          <a:noFill/>
+        </p:spPr>
+        <p:txBody>
+          <a:bodyPr wrap="none" rtlCol="0">
+            <a:spAutoFit/>
+          </a:bodyPr>
+          <a:lstStyle/>
+          <a:p>
+            <a:r>
+              <a:rPr lang="en-US" sz="6600" dirty="0">
+                <a:solidFill>
+                  <a:srgbClr val="FF0000"/>
+                </a:solidFill>
+              </a:rPr>
+              <a:t>Red = C</a:t>
+            </a:r>
+            <a:r>
+              <a:rPr lang="en-US" sz="6600" baseline="-25000" dirty="0">
+                <a:solidFill>
+                  <a:srgbClr val="FF0000"/>
+                </a:solidFill>
+              </a:rPr>
+              <a:t>4</a:t>
+            </a:r>
+            <a:endParaRPr lang="en-US" sz="6600" dirty="0">
+              <a:solidFill>
+                <a:srgbClr val="FF0000"/>
+              </a:solidFill>
+            </a:endParaRPr>
+          </a:p>
+          <a:p>
+            <a:r>
+              <a:rPr lang="en-US" sz="6600" dirty="0">
+                <a:solidFill>
+                  <a:srgbClr val="0432FF"/>
+                </a:solidFill>
+              </a:rPr>
+              <a:t>Blue = C</a:t>
+            </a:r>
+            <a:r>
+              <a:rPr lang="en-US" sz="6600" baseline="-25000" dirty="0">
+                <a:solidFill>
+                  <a:srgbClr val="0432FF"/>
+                </a:solidFill>
+              </a:rPr>
+              <a:t>3</a:t>
+            </a:r>
+            <a:endParaRPr lang="en-US" sz="6600" dirty="0">
+              <a:solidFill>
+                <a:srgbClr val="0432FF"/>
+              </a:solidFill>
+            </a:endParaRPr>
+          </a:p>
+        </p:txBody>
+      </p:sp>
+      <p:pic>
+        <p:nvPicPr>
+          <p:cNvPr id="25" name="Picture 24">
+            <a:extLst>
+              <a:ext uri="{FF2B5EF4-FFF2-40B4-BE49-F238E27FC236}">
+                <a16:creationId xmlns:a16="http://schemas.microsoft.com/office/drawing/2014/main" id="{FBB3BE0A-6A21-D445-A328-9EB9869CA43D}"/>
+              </a:ext>
+            </a:extLst>
+          </p:cNvPr>
+          <p:cNvPicPr>
+            <a:picLocks noChangeAspect="1"/>
+          </p:cNvPicPr>
+          <p:nvPr/>
+        </p:nvPicPr>
+        <p:blipFill>
+          <a:blip r:embed="rId8"/>
+          <a:stretch>
+            <a:fillRect/>
+          </a:stretch>
+        </p:blipFill>
+        <p:spPr>
+          <a:xfrm>
+            <a:off x="1163780" y="30834239"/>
+            <a:ext cx="17605037" cy="5331309"/>
+          </a:xfrm>
+          <a:prstGeom prst="rect">
+            <a:avLst/>
+          </a:prstGeom>
+        </p:spPr>
+      </p:pic>
     </p:spTree>
     <p:extLst>
       <p:ext uri="{BB962C8B-B14F-4D97-AF65-F5344CB8AC3E}">

</xml_diff>